<commit_message>
Updated with the Kartoffelslide
</commit_message>
<xml_diff>
--- a/pages/Wrap_up_Tuesday.pptx
+++ b/pages/Wrap_up_Tuesday.pptx
@@ -10,7 +10,7 @@
   <p:sldIdLst>
     <p:sldId id="256" r:id="rId2"/>
     <p:sldId id="257" r:id="rId3"/>
-    <p:sldId id="259" r:id="rId4"/>
+    <p:sldId id="262" r:id="rId4"/>
     <p:sldId id="260" r:id="rId5"/>
     <p:sldId id="261" r:id="rId6"/>
   </p:sldIdLst>
@@ -111,6 +111,11 @@
       </a:defRPr>
     </a:lvl9pPr>
   </p:defaultTextStyle>
+  <p:extLst>
+    <p:ext uri="{EFAFB233-063F-42B5-8137-9DF3F51BA10A}">
+      <p15:sldGuideLst xmlns:p15="http://schemas.microsoft.com/office/powerpoint/2012/main"/>
+    </p:ext>
+  </p:extLst>
 </p:presentation>
 </file>
 
@@ -551,11 +556,11 @@
 </file>
 
 <file path=ppt/notesSlides/notesSlide2.xml><?xml version="1.0" encoding="utf-8"?>
-<p:notes xmlns:a="http://schemas.openxmlformats.org/drawingml/2006/main" xmlns:r="http://schemas.openxmlformats.org/officeDocument/2006/relationships" xmlns:p="http://schemas.openxmlformats.org/presentationml/2006/main">
+<p:notes xmlns:a="http://schemas.openxmlformats.org/drawingml/2006/main" xmlns:r="http://schemas.openxmlformats.org/officeDocument/2006/relationships" xmlns:p="http://schemas.openxmlformats.org/presentationml/2006/main" showMasterSp="0" showMasterPhAnim="0">
   <p:cSld>
     <p:spTree>
       <p:nvGrpSpPr>
-        <p:cNvPr id="1" name=""/>
+        <p:cNvPr id="1" name="Shape 50"/>
         <p:cNvGrpSpPr/>
         <p:nvPr/>
       </p:nvGrpSpPr>
@@ -569,65 +574,87 @@
       </p:grpSpPr>
       <p:sp>
         <p:nvSpPr>
-          <p:cNvPr id="2" name="Slide Image Placeholder 1"/>
+          <p:cNvPr id="51" name="Google Shape;51;p:notes"/>
           <p:cNvSpPr>
             <a:spLocks noGrp="1" noRot="1" noChangeAspect="1"/>
           </p:cNvSpPr>
           <p:nvPr>
-            <p:ph type="sldImg"/>
-          </p:nvPr>
-        </p:nvSpPr>
-        <p:spPr/>
-      </p:sp>
-      <p:sp>
-        <p:nvSpPr>
-          <p:cNvPr id="3" name="Notes Placeholder 2"/>
-          <p:cNvSpPr>
+            <p:ph type="sldImg" idx="2"/>
+          </p:nvPr>
+        </p:nvSpPr>
+        <p:spPr>
+          <a:xfrm>
+            <a:off x="381000" y="685800"/>
+            <a:ext cx="6096000" cy="3429000"/>
+          </a:xfrm>
+          <a:custGeom>
+            <a:avLst/>
+            <a:gdLst/>
+            <a:ahLst/>
+            <a:cxnLst/>
+            <a:rect l="l" t="t" r="r" b="b"/>
+            <a:pathLst>
+              <a:path w="120000" h="120000" extrusionOk="0">
+                <a:moveTo>
+                  <a:pt x="0" y="0"/>
+                </a:moveTo>
+                <a:lnTo>
+                  <a:pt x="120000" y="0"/>
+                </a:lnTo>
+                <a:lnTo>
+                  <a:pt x="120000" y="120000"/>
+                </a:lnTo>
+                <a:lnTo>
+                  <a:pt x="0" y="120000"/>
+                </a:lnTo>
+                <a:close/>
+              </a:path>
+            </a:pathLst>
+          </a:custGeom>
+        </p:spPr>
+      </p:sp>
+      <p:sp>
+        <p:nvSpPr>
+          <p:cNvPr id="52" name="Google Shape;52;p:notes"/>
+          <p:cNvSpPr txBox="1">
             <a:spLocks noGrp="1"/>
           </p:cNvSpPr>
           <p:nvPr>
             <p:ph type="body" idx="1"/>
           </p:nvPr>
         </p:nvSpPr>
-        <p:spPr/>
-        <p:txBody>
-          <a:bodyPr/>
+        <p:spPr>
+          <a:xfrm>
+            <a:off x="685800" y="4343400"/>
+            <a:ext cx="5486400" cy="4114800"/>
+          </a:xfrm>
+          <a:prstGeom prst="rect">
+            <a:avLst/>
+          </a:prstGeom>
+        </p:spPr>
+        <p:txBody>
+          <a:bodyPr spcFirstLastPara="1" wrap="square" lIns="91425" tIns="91425" rIns="91425" bIns="91425" anchor="t" anchorCtr="0">
+            <a:noAutofit/>
+          </a:bodyPr>
           <a:lstStyle/>
           <a:p>
-            <a:r>
-              <a:rPr lang="en-US" dirty="0"/>
-              <a:t>Be careful about the log and the scaling. </a:t>
-            </a:r>
-          </a:p>
-        </p:txBody>
-      </p:sp>
-      <p:sp>
-        <p:nvSpPr>
-          <p:cNvPr id="4" name="Slide Number Placeholder 3"/>
-          <p:cNvSpPr>
-            <a:spLocks noGrp="1"/>
-          </p:cNvSpPr>
-          <p:nvPr>
-            <p:ph type="sldNum" sz="quarter" idx="5"/>
-          </p:nvPr>
-        </p:nvSpPr>
-        <p:spPr/>
-        <p:txBody>
-          <a:bodyPr/>
-          <a:lstStyle/>
-          <a:p>
-            <a:fld id="{70697C68-CE58-0D4E-933F-CDB92AA6CC2C}" type="slidenum">
-              <a:rPr lang="en-US" smtClean="0"/>
-              <a:t>3</a:t>
-            </a:fld>
-            <a:endParaRPr lang="en-US"/>
+            <a:pPr marL="0" lvl="0" indent="0" algn="l" rtl="0">
+              <a:spcBef>
+                <a:spcPts val="0"/>
+              </a:spcBef>
+              <a:spcAft>
+                <a:spcPts val="0"/>
+              </a:spcAft>
+              <a:buNone/>
+            </a:pPr>
+            <a:endParaRPr/>
           </a:p>
         </p:txBody>
       </p:sp>
     </p:spTree>
     <p:extLst>
       <p:ext uri="{BB962C8B-B14F-4D97-AF65-F5344CB8AC3E}">
-        <p14:creationId xmlns:p14="http://schemas.microsoft.com/office/powerpoint/2010/main" val="3493103177"/>
+        <p14:creationId xmlns:p14="http://schemas.microsoft.com/office/powerpoint/2010/main" val="1928109850"/>
       </p:ext>
     </p:extLst>
   </p:cSld>
@@ -4157,7 +4184,7 @@
   <p:cSld>
     <p:spTree>
       <p:nvGrpSpPr>
-        <p:cNvPr id="1" name=""/>
+        <p:cNvPr id="1" name="Shape 53"/>
         <p:cNvGrpSpPr/>
         <p:nvPr/>
       </p:nvGrpSpPr>
@@ -4169,50 +4196,2697 @@
           <a:chExt cx="0" cy="0"/>
         </a:xfrm>
       </p:grpSpPr>
-      <p:sp>
-        <p:nvSpPr>
-          <p:cNvPr id="2" name="Title 1">
-            <a:extLst>
-              <a:ext uri="{FF2B5EF4-FFF2-40B4-BE49-F238E27FC236}">
-                <a16:creationId xmlns:a16="http://schemas.microsoft.com/office/drawing/2014/main" id="{05D3DCAA-82D1-8940-A5AC-AAD1C0AC99B8}"/>
-              </a:ext>
-            </a:extLst>
-          </p:cNvPr>
-          <p:cNvSpPr>
-            <a:spLocks noGrp="1"/>
-          </p:cNvSpPr>
-          <p:nvPr>
-            <p:ph type="title"/>
-          </p:nvPr>
-        </p:nvSpPr>
-        <p:spPr>
-          <a:xfrm>
-            <a:off x="838200" y="1828165"/>
-            <a:ext cx="10515600" cy="1325563"/>
-          </a:xfrm>
-        </p:spPr>
-        <p:txBody>
-          <a:bodyPr/>
+      <p:pic>
+        <p:nvPicPr>
+          <p:cNvPr id="54" name="Google Shape;54;p13"/>
+          <p:cNvPicPr preferRelativeResize="0"/>
+          <p:nvPr/>
+        </p:nvPicPr>
+        <p:blipFill>
+          <a:blip r:embed="rId3">
+            <a:alphaModFix/>
+          </a:blip>
+          <a:stretch>
+            <a:fillRect/>
+          </a:stretch>
+        </p:blipFill>
+        <p:spPr>
+          <a:xfrm>
+            <a:off x="998667" y="1962267"/>
+            <a:ext cx="464820" cy="609600"/>
+          </a:xfrm>
+          <a:prstGeom prst="rect">
+            <a:avLst/>
+          </a:prstGeom>
+          <a:noFill/>
+          <a:ln>
+            <a:noFill/>
+          </a:ln>
+        </p:spPr>
+      </p:pic>
+      <p:pic>
+        <p:nvPicPr>
+          <p:cNvPr id="55" name="Google Shape;55;p13"/>
+          <p:cNvPicPr preferRelativeResize="0"/>
+          <p:nvPr/>
+        </p:nvPicPr>
+        <p:blipFill>
+          <a:blip r:embed="rId3">
+            <a:alphaModFix/>
+          </a:blip>
+          <a:stretch>
+            <a:fillRect/>
+          </a:stretch>
+        </p:blipFill>
+        <p:spPr>
+          <a:xfrm>
+            <a:off x="2852867" y="311267"/>
+            <a:ext cx="464820" cy="609600"/>
+          </a:xfrm>
+          <a:prstGeom prst="rect">
+            <a:avLst/>
+          </a:prstGeom>
+          <a:noFill/>
+          <a:ln>
+            <a:noFill/>
+          </a:ln>
+        </p:spPr>
+      </p:pic>
+      <p:pic>
+        <p:nvPicPr>
+          <p:cNvPr id="56" name="Google Shape;56;p13"/>
+          <p:cNvPicPr preferRelativeResize="0"/>
+          <p:nvPr/>
+        </p:nvPicPr>
+        <p:blipFill>
+          <a:blip r:embed="rId3">
+            <a:alphaModFix/>
+          </a:blip>
+          <a:stretch>
+            <a:fillRect/>
+          </a:stretch>
+        </p:blipFill>
+        <p:spPr>
+          <a:xfrm>
+            <a:off x="3259267" y="616067"/>
+            <a:ext cx="464820" cy="609600"/>
+          </a:xfrm>
+          <a:prstGeom prst="rect">
+            <a:avLst/>
+          </a:prstGeom>
+          <a:noFill/>
+          <a:ln>
+            <a:noFill/>
+          </a:ln>
+        </p:spPr>
+      </p:pic>
+      <p:pic>
+        <p:nvPicPr>
+          <p:cNvPr id="57" name="Google Shape;57;p13"/>
+          <p:cNvPicPr preferRelativeResize="0"/>
+          <p:nvPr/>
+        </p:nvPicPr>
+        <p:blipFill>
+          <a:blip r:embed="rId3">
+            <a:alphaModFix/>
+          </a:blip>
+          <a:stretch>
+            <a:fillRect/>
+          </a:stretch>
+        </p:blipFill>
+        <p:spPr>
+          <a:xfrm>
+            <a:off x="2852867" y="1022467"/>
+            <a:ext cx="464820" cy="609600"/>
+          </a:xfrm>
+          <a:prstGeom prst="rect">
+            <a:avLst/>
+          </a:prstGeom>
+          <a:noFill/>
+          <a:ln>
+            <a:noFill/>
+          </a:ln>
+        </p:spPr>
+      </p:pic>
+      <p:pic>
+        <p:nvPicPr>
+          <p:cNvPr id="58" name="Google Shape;58;p13"/>
+          <p:cNvPicPr preferRelativeResize="0"/>
+          <p:nvPr/>
+        </p:nvPicPr>
+        <p:blipFill>
+          <a:blip r:embed="rId3">
+            <a:alphaModFix/>
+          </a:blip>
+          <a:stretch>
+            <a:fillRect/>
+          </a:stretch>
+        </p:blipFill>
+        <p:spPr>
+          <a:xfrm>
+            <a:off x="3259267" y="1327267"/>
+            <a:ext cx="464820" cy="609600"/>
+          </a:xfrm>
+          <a:prstGeom prst="rect">
+            <a:avLst/>
+          </a:prstGeom>
+          <a:noFill/>
+          <a:ln>
+            <a:noFill/>
+          </a:ln>
+        </p:spPr>
+      </p:pic>
+      <p:pic>
+        <p:nvPicPr>
+          <p:cNvPr id="59" name="Google Shape;59;p13"/>
+          <p:cNvPicPr preferRelativeResize="0"/>
+          <p:nvPr/>
+        </p:nvPicPr>
+        <p:blipFill>
+          <a:blip r:embed="rId3">
+            <a:alphaModFix/>
+          </a:blip>
+          <a:stretch>
+            <a:fillRect/>
+          </a:stretch>
+        </p:blipFill>
+        <p:spPr>
+          <a:xfrm>
+            <a:off x="2852867" y="1733667"/>
+            <a:ext cx="464820" cy="609600"/>
+          </a:xfrm>
+          <a:prstGeom prst="rect">
+            <a:avLst/>
+          </a:prstGeom>
+          <a:noFill/>
+          <a:ln>
+            <a:noFill/>
+          </a:ln>
+        </p:spPr>
+      </p:pic>
+      <p:pic>
+        <p:nvPicPr>
+          <p:cNvPr id="60" name="Google Shape;60;p13"/>
+          <p:cNvPicPr preferRelativeResize="0"/>
+          <p:nvPr/>
+        </p:nvPicPr>
+        <p:blipFill>
+          <a:blip r:embed="rId3">
+            <a:alphaModFix/>
+          </a:blip>
+          <a:stretch>
+            <a:fillRect/>
+          </a:stretch>
+        </p:blipFill>
+        <p:spPr>
+          <a:xfrm>
+            <a:off x="3259267" y="2038467"/>
+            <a:ext cx="464820" cy="609600"/>
+          </a:xfrm>
+          <a:prstGeom prst="rect">
+            <a:avLst/>
+          </a:prstGeom>
+          <a:noFill/>
+          <a:ln>
+            <a:noFill/>
+          </a:ln>
+        </p:spPr>
+      </p:pic>
+      <p:pic>
+        <p:nvPicPr>
+          <p:cNvPr id="61" name="Google Shape;61;p13"/>
+          <p:cNvPicPr preferRelativeResize="0"/>
+          <p:nvPr/>
+        </p:nvPicPr>
+        <p:blipFill>
+          <a:blip r:embed="rId3">
+            <a:alphaModFix/>
+          </a:blip>
+          <a:stretch>
+            <a:fillRect/>
+          </a:stretch>
+        </p:blipFill>
+        <p:spPr>
+          <a:xfrm>
+            <a:off x="2852867" y="2444867"/>
+            <a:ext cx="464820" cy="609600"/>
+          </a:xfrm>
+          <a:prstGeom prst="rect">
+            <a:avLst/>
+          </a:prstGeom>
+          <a:noFill/>
+          <a:ln>
+            <a:noFill/>
+          </a:ln>
+        </p:spPr>
+      </p:pic>
+      <p:pic>
+        <p:nvPicPr>
+          <p:cNvPr id="62" name="Google Shape;62;p13"/>
+          <p:cNvPicPr preferRelativeResize="0"/>
+          <p:nvPr/>
+        </p:nvPicPr>
+        <p:blipFill>
+          <a:blip r:embed="rId3">
+            <a:alphaModFix/>
+          </a:blip>
+          <a:stretch>
+            <a:fillRect/>
+          </a:stretch>
+        </p:blipFill>
+        <p:spPr>
+          <a:xfrm>
+            <a:off x="3259267" y="2749667"/>
+            <a:ext cx="464820" cy="609600"/>
+          </a:xfrm>
+          <a:prstGeom prst="rect">
+            <a:avLst/>
+          </a:prstGeom>
+          <a:noFill/>
+          <a:ln>
+            <a:noFill/>
+          </a:ln>
+        </p:spPr>
+      </p:pic>
+      <p:pic>
+        <p:nvPicPr>
+          <p:cNvPr id="63" name="Google Shape;63;p13"/>
+          <p:cNvPicPr preferRelativeResize="0"/>
+          <p:nvPr/>
+        </p:nvPicPr>
+        <p:blipFill>
+          <a:blip r:embed="rId3">
+            <a:alphaModFix/>
+          </a:blip>
+          <a:stretch>
+            <a:fillRect/>
+          </a:stretch>
+        </p:blipFill>
+        <p:spPr>
+          <a:xfrm>
+            <a:off x="2852867" y="3156067"/>
+            <a:ext cx="464820" cy="609600"/>
+          </a:xfrm>
+          <a:prstGeom prst="rect">
+            <a:avLst/>
+          </a:prstGeom>
+          <a:noFill/>
+          <a:ln>
+            <a:noFill/>
+          </a:ln>
+        </p:spPr>
+      </p:pic>
+      <p:pic>
+        <p:nvPicPr>
+          <p:cNvPr id="64" name="Google Shape;64;p13"/>
+          <p:cNvPicPr preferRelativeResize="0"/>
+          <p:nvPr/>
+        </p:nvPicPr>
+        <p:blipFill>
+          <a:blip r:embed="rId3">
+            <a:alphaModFix/>
+          </a:blip>
+          <a:stretch>
+            <a:fillRect/>
+          </a:stretch>
+        </p:blipFill>
+        <p:spPr>
+          <a:xfrm>
+            <a:off x="3259267" y="3460867"/>
+            <a:ext cx="464820" cy="609600"/>
+          </a:xfrm>
+          <a:prstGeom prst="rect">
+            <a:avLst/>
+          </a:prstGeom>
+          <a:noFill/>
+          <a:ln>
+            <a:noFill/>
+          </a:ln>
+        </p:spPr>
+      </p:pic>
+      <p:pic>
+        <p:nvPicPr>
+          <p:cNvPr id="65" name="Google Shape;65;p13"/>
+          <p:cNvPicPr preferRelativeResize="0"/>
+          <p:nvPr/>
+        </p:nvPicPr>
+        <p:blipFill>
+          <a:blip r:embed="rId3">
+            <a:alphaModFix/>
+          </a:blip>
+          <a:stretch>
+            <a:fillRect/>
+          </a:stretch>
+        </p:blipFill>
+        <p:spPr>
+          <a:xfrm>
+            <a:off x="2852867" y="3867267"/>
+            <a:ext cx="464820" cy="609600"/>
+          </a:xfrm>
+          <a:prstGeom prst="rect">
+            <a:avLst/>
+          </a:prstGeom>
+          <a:noFill/>
+          <a:ln>
+            <a:noFill/>
+          </a:ln>
+        </p:spPr>
+      </p:pic>
+      <p:pic>
+        <p:nvPicPr>
+          <p:cNvPr id="66" name="Google Shape;66;p13"/>
+          <p:cNvPicPr preferRelativeResize="0"/>
+          <p:nvPr/>
+        </p:nvPicPr>
+        <p:blipFill>
+          <a:blip r:embed="rId3">
+            <a:alphaModFix/>
+          </a:blip>
+          <a:stretch>
+            <a:fillRect/>
+          </a:stretch>
+        </p:blipFill>
+        <p:spPr>
+          <a:xfrm>
+            <a:off x="3259267" y="4172067"/>
+            <a:ext cx="464820" cy="609600"/>
+          </a:xfrm>
+          <a:prstGeom prst="rect">
+            <a:avLst/>
+          </a:prstGeom>
+          <a:noFill/>
+          <a:ln>
+            <a:noFill/>
+          </a:ln>
+        </p:spPr>
+      </p:pic>
+      <p:pic>
+        <p:nvPicPr>
+          <p:cNvPr id="67" name="Google Shape;67;p13"/>
+          <p:cNvPicPr preferRelativeResize="0"/>
+          <p:nvPr/>
+        </p:nvPicPr>
+        <p:blipFill>
+          <a:blip r:embed="rId3">
+            <a:alphaModFix/>
+          </a:blip>
+          <a:stretch>
+            <a:fillRect/>
+          </a:stretch>
+        </p:blipFill>
+        <p:spPr>
+          <a:xfrm>
+            <a:off x="4884867" y="311267"/>
+            <a:ext cx="464820" cy="609600"/>
+          </a:xfrm>
+          <a:prstGeom prst="rect">
+            <a:avLst/>
+          </a:prstGeom>
+          <a:noFill/>
+          <a:ln>
+            <a:noFill/>
+          </a:ln>
+        </p:spPr>
+      </p:pic>
+      <p:pic>
+        <p:nvPicPr>
+          <p:cNvPr id="68" name="Google Shape;68;p13"/>
+          <p:cNvPicPr preferRelativeResize="0"/>
+          <p:nvPr/>
+        </p:nvPicPr>
+        <p:blipFill>
+          <a:blip r:embed="rId3">
+            <a:alphaModFix/>
+          </a:blip>
+          <a:stretch>
+            <a:fillRect/>
+          </a:stretch>
+        </p:blipFill>
+        <p:spPr>
+          <a:xfrm>
+            <a:off x="5291267" y="616067"/>
+            <a:ext cx="464820" cy="609600"/>
+          </a:xfrm>
+          <a:prstGeom prst="rect">
+            <a:avLst/>
+          </a:prstGeom>
+          <a:noFill/>
+          <a:ln>
+            <a:noFill/>
+          </a:ln>
+        </p:spPr>
+      </p:pic>
+      <p:pic>
+        <p:nvPicPr>
+          <p:cNvPr id="69" name="Google Shape;69;p13"/>
+          <p:cNvPicPr preferRelativeResize="0"/>
+          <p:nvPr/>
+        </p:nvPicPr>
+        <p:blipFill>
+          <a:blip r:embed="rId3">
+            <a:alphaModFix/>
+          </a:blip>
+          <a:stretch>
+            <a:fillRect/>
+          </a:stretch>
+        </p:blipFill>
+        <p:spPr>
+          <a:xfrm>
+            <a:off x="4884867" y="1022467"/>
+            <a:ext cx="464820" cy="609600"/>
+          </a:xfrm>
+          <a:prstGeom prst="rect">
+            <a:avLst/>
+          </a:prstGeom>
+          <a:noFill/>
+          <a:ln>
+            <a:noFill/>
+          </a:ln>
+        </p:spPr>
+      </p:pic>
+      <p:pic>
+        <p:nvPicPr>
+          <p:cNvPr id="70" name="Google Shape;70;p13"/>
+          <p:cNvPicPr preferRelativeResize="0"/>
+          <p:nvPr/>
+        </p:nvPicPr>
+        <p:blipFill>
+          <a:blip r:embed="rId3">
+            <a:alphaModFix/>
+          </a:blip>
+          <a:stretch>
+            <a:fillRect/>
+          </a:stretch>
+        </p:blipFill>
+        <p:spPr>
+          <a:xfrm>
+            <a:off x="5291267" y="1327267"/>
+            <a:ext cx="464820" cy="609600"/>
+          </a:xfrm>
+          <a:prstGeom prst="rect">
+            <a:avLst/>
+          </a:prstGeom>
+          <a:noFill/>
+          <a:ln>
+            <a:noFill/>
+          </a:ln>
+        </p:spPr>
+      </p:pic>
+      <p:pic>
+        <p:nvPicPr>
+          <p:cNvPr id="71" name="Google Shape;71;p13"/>
+          <p:cNvPicPr preferRelativeResize="0"/>
+          <p:nvPr/>
+        </p:nvPicPr>
+        <p:blipFill>
+          <a:blip r:embed="rId3">
+            <a:alphaModFix/>
+          </a:blip>
+          <a:stretch>
+            <a:fillRect/>
+          </a:stretch>
+        </p:blipFill>
+        <p:spPr>
+          <a:xfrm>
+            <a:off x="4884867" y="1733667"/>
+            <a:ext cx="464820" cy="609600"/>
+          </a:xfrm>
+          <a:prstGeom prst="rect">
+            <a:avLst/>
+          </a:prstGeom>
+          <a:noFill/>
+          <a:ln>
+            <a:noFill/>
+          </a:ln>
+        </p:spPr>
+      </p:pic>
+      <p:pic>
+        <p:nvPicPr>
+          <p:cNvPr id="72" name="Google Shape;72;p13"/>
+          <p:cNvPicPr preferRelativeResize="0"/>
+          <p:nvPr/>
+        </p:nvPicPr>
+        <p:blipFill>
+          <a:blip r:embed="rId3">
+            <a:alphaModFix/>
+          </a:blip>
+          <a:stretch>
+            <a:fillRect/>
+          </a:stretch>
+        </p:blipFill>
+        <p:spPr>
+          <a:xfrm>
+            <a:off x="5291267" y="2038467"/>
+            <a:ext cx="464820" cy="609600"/>
+          </a:xfrm>
+          <a:prstGeom prst="rect">
+            <a:avLst/>
+          </a:prstGeom>
+          <a:noFill/>
+          <a:ln>
+            <a:noFill/>
+          </a:ln>
+        </p:spPr>
+      </p:pic>
+      <p:pic>
+        <p:nvPicPr>
+          <p:cNvPr id="73" name="Google Shape;73;p13"/>
+          <p:cNvPicPr preferRelativeResize="0"/>
+          <p:nvPr/>
+        </p:nvPicPr>
+        <p:blipFill>
+          <a:blip r:embed="rId3">
+            <a:alphaModFix/>
+          </a:blip>
+          <a:stretch>
+            <a:fillRect/>
+          </a:stretch>
+        </p:blipFill>
+        <p:spPr>
+          <a:xfrm>
+            <a:off x="4884867" y="2444867"/>
+            <a:ext cx="464820" cy="609600"/>
+          </a:xfrm>
+          <a:prstGeom prst="rect">
+            <a:avLst/>
+          </a:prstGeom>
+          <a:noFill/>
+          <a:ln>
+            <a:noFill/>
+          </a:ln>
+        </p:spPr>
+      </p:pic>
+      <p:pic>
+        <p:nvPicPr>
+          <p:cNvPr id="74" name="Google Shape;74;p13"/>
+          <p:cNvPicPr preferRelativeResize="0"/>
+          <p:nvPr/>
+        </p:nvPicPr>
+        <p:blipFill>
+          <a:blip r:embed="rId3">
+            <a:alphaModFix/>
+          </a:blip>
+          <a:stretch>
+            <a:fillRect/>
+          </a:stretch>
+        </p:blipFill>
+        <p:spPr>
+          <a:xfrm>
+            <a:off x="5291267" y="2749667"/>
+            <a:ext cx="464820" cy="609600"/>
+          </a:xfrm>
+          <a:prstGeom prst="rect">
+            <a:avLst/>
+          </a:prstGeom>
+          <a:noFill/>
+          <a:ln>
+            <a:noFill/>
+          </a:ln>
+        </p:spPr>
+      </p:pic>
+      <p:pic>
+        <p:nvPicPr>
+          <p:cNvPr id="75" name="Google Shape;75;p13"/>
+          <p:cNvPicPr preferRelativeResize="0"/>
+          <p:nvPr/>
+        </p:nvPicPr>
+        <p:blipFill>
+          <a:blip r:embed="rId3">
+            <a:alphaModFix/>
+          </a:blip>
+          <a:stretch>
+            <a:fillRect/>
+          </a:stretch>
+        </p:blipFill>
+        <p:spPr>
+          <a:xfrm>
+            <a:off x="4884867" y="3156067"/>
+            <a:ext cx="464820" cy="609600"/>
+          </a:xfrm>
+          <a:prstGeom prst="rect">
+            <a:avLst/>
+          </a:prstGeom>
+          <a:noFill/>
+          <a:ln>
+            <a:noFill/>
+          </a:ln>
+        </p:spPr>
+      </p:pic>
+      <p:pic>
+        <p:nvPicPr>
+          <p:cNvPr id="76" name="Google Shape;76;p13"/>
+          <p:cNvPicPr preferRelativeResize="0"/>
+          <p:nvPr/>
+        </p:nvPicPr>
+        <p:blipFill>
+          <a:blip r:embed="rId3">
+            <a:alphaModFix/>
+          </a:blip>
+          <a:stretch>
+            <a:fillRect/>
+          </a:stretch>
+        </p:blipFill>
+        <p:spPr>
+          <a:xfrm>
+            <a:off x="5291267" y="3460867"/>
+            <a:ext cx="464820" cy="609600"/>
+          </a:xfrm>
+          <a:prstGeom prst="rect">
+            <a:avLst/>
+          </a:prstGeom>
+          <a:noFill/>
+          <a:ln>
+            <a:noFill/>
+          </a:ln>
+        </p:spPr>
+      </p:pic>
+      <p:pic>
+        <p:nvPicPr>
+          <p:cNvPr id="77" name="Google Shape;77;p13"/>
+          <p:cNvPicPr preferRelativeResize="0"/>
+          <p:nvPr/>
+        </p:nvPicPr>
+        <p:blipFill>
+          <a:blip r:embed="rId3">
+            <a:alphaModFix/>
+          </a:blip>
+          <a:stretch>
+            <a:fillRect/>
+          </a:stretch>
+        </p:blipFill>
+        <p:spPr>
+          <a:xfrm>
+            <a:off x="4884867" y="3867267"/>
+            <a:ext cx="464820" cy="609600"/>
+          </a:xfrm>
+          <a:prstGeom prst="rect">
+            <a:avLst/>
+          </a:prstGeom>
+          <a:noFill/>
+          <a:ln>
+            <a:noFill/>
+          </a:ln>
+        </p:spPr>
+      </p:pic>
+      <p:pic>
+        <p:nvPicPr>
+          <p:cNvPr id="78" name="Google Shape;78;p13"/>
+          <p:cNvPicPr preferRelativeResize="0"/>
+          <p:nvPr/>
+        </p:nvPicPr>
+        <p:blipFill>
+          <a:blip r:embed="rId3">
+            <a:alphaModFix/>
+          </a:blip>
+          <a:stretch>
+            <a:fillRect/>
+          </a:stretch>
+        </p:blipFill>
+        <p:spPr>
+          <a:xfrm>
+            <a:off x="5291267" y="4172067"/>
+            <a:ext cx="464820" cy="609600"/>
+          </a:xfrm>
+          <a:prstGeom prst="rect">
+            <a:avLst/>
+          </a:prstGeom>
+          <a:noFill/>
+          <a:ln>
+            <a:noFill/>
+          </a:ln>
+        </p:spPr>
+      </p:pic>
+      <p:pic>
+        <p:nvPicPr>
+          <p:cNvPr id="79" name="Google Shape;79;p13"/>
+          <p:cNvPicPr preferRelativeResize="0"/>
+          <p:nvPr/>
+        </p:nvPicPr>
+        <p:blipFill>
+          <a:blip r:embed="rId3">
+            <a:alphaModFix/>
+          </a:blip>
+          <a:stretch>
+            <a:fillRect/>
+          </a:stretch>
+        </p:blipFill>
+        <p:spPr>
+          <a:xfrm>
+            <a:off x="5756101" y="228600"/>
+            <a:ext cx="464820" cy="609600"/>
+          </a:xfrm>
+          <a:prstGeom prst="rect">
+            <a:avLst/>
+          </a:prstGeom>
+          <a:noFill/>
+          <a:ln>
+            <a:noFill/>
+          </a:ln>
+        </p:spPr>
+      </p:pic>
+      <p:pic>
+        <p:nvPicPr>
+          <p:cNvPr id="80" name="Google Shape;80;p13"/>
+          <p:cNvPicPr preferRelativeResize="0"/>
+          <p:nvPr/>
+        </p:nvPicPr>
+        <p:blipFill>
+          <a:blip r:embed="rId3">
+            <a:alphaModFix/>
+          </a:blip>
+          <a:stretch>
+            <a:fillRect/>
+          </a:stretch>
+        </p:blipFill>
+        <p:spPr>
+          <a:xfrm>
+            <a:off x="6162501" y="533400"/>
+            <a:ext cx="464820" cy="609600"/>
+          </a:xfrm>
+          <a:prstGeom prst="rect">
+            <a:avLst/>
+          </a:prstGeom>
+          <a:noFill/>
+          <a:ln>
+            <a:noFill/>
+          </a:ln>
+        </p:spPr>
+      </p:pic>
+      <p:pic>
+        <p:nvPicPr>
+          <p:cNvPr id="81" name="Google Shape;81;p13"/>
+          <p:cNvPicPr preferRelativeResize="0"/>
+          <p:nvPr/>
+        </p:nvPicPr>
+        <p:blipFill>
+          <a:blip r:embed="rId3">
+            <a:alphaModFix/>
+          </a:blip>
+          <a:stretch>
+            <a:fillRect/>
+          </a:stretch>
+        </p:blipFill>
+        <p:spPr>
+          <a:xfrm>
+            <a:off x="5756101" y="939800"/>
+            <a:ext cx="464820" cy="609600"/>
+          </a:xfrm>
+          <a:prstGeom prst="rect">
+            <a:avLst/>
+          </a:prstGeom>
+          <a:noFill/>
+          <a:ln>
+            <a:noFill/>
+          </a:ln>
+        </p:spPr>
+      </p:pic>
+      <p:pic>
+        <p:nvPicPr>
+          <p:cNvPr id="82" name="Google Shape;82;p13"/>
+          <p:cNvPicPr preferRelativeResize="0"/>
+          <p:nvPr/>
+        </p:nvPicPr>
+        <p:blipFill>
+          <a:blip r:embed="rId3">
+            <a:alphaModFix/>
+          </a:blip>
+          <a:stretch>
+            <a:fillRect/>
+          </a:stretch>
+        </p:blipFill>
+        <p:spPr>
+          <a:xfrm>
+            <a:off x="6162501" y="1244600"/>
+            <a:ext cx="464820" cy="609600"/>
+          </a:xfrm>
+          <a:prstGeom prst="rect">
+            <a:avLst/>
+          </a:prstGeom>
+          <a:noFill/>
+          <a:ln>
+            <a:noFill/>
+          </a:ln>
+        </p:spPr>
+      </p:pic>
+      <p:pic>
+        <p:nvPicPr>
+          <p:cNvPr id="83" name="Google Shape;83;p13"/>
+          <p:cNvPicPr preferRelativeResize="0"/>
+          <p:nvPr/>
+        </p:nvPicPr>
+        <p:blipFill>
+          <a:blip r:embed="rId3">
+            <a:alphaModFix/>
+          </a:blip>
+          <a:stretch>
+            <a:fillRect/>
+          </a:stretch>
+        </p:blipFill>
+        <p:spPr>
+          <a:xfrm>
+            <a:off x="5756101" y="1651000"/>
+            <a:ext cx="464820" cy="609600"/>
+          </a:xfrm>
+          <a:prstGeom prst="rect">
+            <a:avLst/>
+          </a:prstGeom>
+          <a:noFill/>
+          <a:ln>
+            <a:noFill/>
+          </a:ln>
+        </p:spPr>
+      </p:pic>
+      <p:pic>
+        <p:nvPicPr>
+          <p:cNvPr id="84" name="Google Shape;84;p13"/>
+          <p:cNvPicPr preferRelativeResize="0"/>
+          <p:nvPr/>
+        </p:nvPicPr>
+        <p:blipFill>
+          <a:blip r:embed="rId3">
+            <a:alphaModFix/>
+          </a:blip>
+          <a:stretch>
+            <a:fillRect/>
+          </a:stretch>
+        </p:blipFill>
+        <p:spPr>
+          <a:xfrm>
+            <a:off x="6162501" y="1955800"/>
+            <a:ext cx="464820" cy="609600"/>
+          </a:xfrm>
+          <a:prstGeom prst="rect">
+            <a:avLst/>
+          </a:prstGeom>
+          <a:noFill/>
+          <a:ln>
+            <a:noFill/>
+          </a:ln>
+        </p:spPr>
+      </p:pic>
+      <p:pic>
+        <p:nvPicPr>
+          <p:cNvPr id="85" name="Google Shape;85;p13"/>
+          <p:cNvPicPr preferRelativeResize="0"/>
+          <p:nvPr/>
+        </p:nvPicPr>
+        <p:blipFill>
+          <a:blip r:embed="rId3">
+            <a:alphaModFix/>
+          </a:blip>
+          <a:stretch>
+            <a:fillRect/>
+          </a:stretch>
+        </p:blipFill>
+        <p:spPr>
+          <a:xfrm>
+            <a:off x="5756101" y="2362200"/>
+            <a:ext cx="464820" cy="609600"/>
+          </a:xfrm>
+          <a:prstGeom prst="rect">
+            <a:avLst/>
+          </a:prstGeom>
+          <a:noFill/>
+          <a:ln>
+            <a:noFill/>
+          </a:ln>
+        </p:spPr>
+      </p:pic>
+      <p:pic>
+        <p:nvPicPr>
+          <p:cNvPr id="86" name="Google Shape;86;p13"/>
+          <p:cNvPicPr preferRelativeResize="0"/>
+          <p:nvPr/>
+        </p:nvPicPr>
+        <p:blipFill>
+          <a:blip r:embed="rId3">
+            <a:alphaModFix/>
+          </a:blip>
+          <a:stretch>
+            <a:fillRect/>
+          </a:stretch>
+        </p:blipFill>
+        <p:spPr>
+          <a:xfrm>
+            <a:off x="6162501" y="2667000"/>
+            <a:ext cx="464820" cy="609600"/>
+          </a:xfrm>
+          <a:prstGeom prst="rect">
+            <a:avLst/>
+          </a:prstGeom>
+          <a:noFill/>
+          <a:ln>
+            <a:noFill/>
+          </a:ln>
+        </p:spPr>
+      </p:pic>
+      <p:pic>
+        <p:nvPicPr>
+          <p:cNvPr id="87" name="Google Shape;87;p13"/>
+          <p:cNvPicPr preferRelativeResize="0"/>
+          <p:nvPr/>
+        </p:nvPicPr>
+        <p:blipFill>
+          <a:blip r:embed="rId3">
+            <a:alphaModFix/>
+          </a:blip>
+          <a:stretch>
+            <a:fillRect/>
+          </a:stretch>
+        </p:blipFill>
+        <p:spPr>
+          <a:xfrm>
+            <a:off x="5756101" y="3073400"/>
+            <a:ext cx="464820" cy="609600"/>
+          </a:xfrm>
+          <a:prstGeom prst="rect">
+            <a:avLst/>
+          </a:prstGeom>
+          <a:noFill/>
+          <a:ln>
+            <a:noFill/>
+          </a:ln>
+        </p:spPr>
+      </p:pic>
+      <p:pic>
+        <p:nvPicPr>
+          <p:cNvPr id="88" name="Google Shape;88;p13"/>
+          <p:cNvPicPr preferRelativeResize="0"/>
+          <p:nvPr/>
+        </p:nvPicPr>
+        <p:blipFill>
+          <a:blip r:embed="rId3">
+            <a:alphaModFix/>
+          </a:blip>
+          <a:stretch>
+            <a:fillRect/>
+          </a:stretch>
+        </p:blipFill>
+        <p:spPr>
+          <a:xfrm>
+            <a:off x="6162501" y="3378200"/>
+            <a:ext cx="464820" cy="609600"/>
+          </a:xfrm>
+          <a:prstGeom prst="rect">
+            <a:avLst/>
+          </a:prstGeom>
+          <a:noFill/>
+          <a:ln>
+            <a:noFill/>
+          </a:ln>
+        </p:spPr>
+      </p:pic>
+      <p:pic>
+        <p:nvPicPr>
+          <p:cNvPr id="89" name="Google Shape;89;p13"/>
+          <p:cNvPicPr preferRelativeResize="0"/>
+          <p:nvPr/>
+        </p:nvPicPr>
+        <p:blipFill>
+          <a:blip r:embed="rId3">
+            <a:alphaModFix/>
+          </a:blip>
+          <a:stretch>
+            <a:fillRect/>
+          </a:stretch>
+        </p:blipFill>
+        <p:spPr>
+          <a:xfrm>
+            <a:off x="5756101" y="3784600"/>
+            <a:ext cx="464820" cy="609600"/>
+          </a:xfrm>
+          <a:prstGeom prst="rect">
+            <a:avLst/>
+          </a:prstGeom>
+          <a:noFill/>
+          <a:ln>
+            <a:noFill/>
+          </a:ln>
+        </p:spPr>
+      </p:pic>
+      <p:pic>
+        <p:nvPicPr>
+          <p:cNvPr id="90" name="Google Shape;90;p13"/>
+          <p:cNvPicPr preferRelativeResize="0"/>
+          <p:nvPr/>
+        </p:nvPicPr>
+        <p:blipFill>
+          <a:blip r:embed="rId3">
+            <a:alphaModFix/>
+          </a:blip>
+          <a:stretch>
+            <a:fillRect/>
+          </a:stretch>
+        </p:blipFill>
+        <p:spPr>
+          <a:xfrm>
+            <a:off x="6162501" y="4089400"/>
+            <a:ext cx="464820" cy="609600"/>
+          </a:xfrm>
+          <a:prstGeom prst="rect">
+            <a:avLst/>
+          </a:prstGeom>
+          <a:noFill/>
+          <a:ln>
+            <a:noFill/>
+          </a:ln>
+        </p:spPr>
+      </p:pic>
+      <p:pic>
+        <p:nvPicPr>
+          <p:cNvPr id="91" name="Google Shape;91;p13"/>
+          <p:cNvPicPr preferRelativeResize="0"/>
+          <p:nvPr/>
+        </p:nvPicPr>
+        <p:blipFill>
+          <a:blip r:embed="rId3">
+            <a:alphaModFix/>
+          </a:blip>
+          <a:stretch>
+            <a:fillRect/>
+          </a:stretch>
+        </p:blipFill>
+        <p:spPr>
+          <a:xfrm>
+            <a:off x="7440134" y="311267"/>
+            <a:ext cx="464820" cy="609600"/>
+          </a:xfrm>
+          <a:prstGeom prst="rect">
+            <a:avLst/>
+          </a:prstGeom>
+          <a:noFill/>
+          <a:ln>
+            <a:noFill/>
+          </a:ln>
+        </p:spPr>
+      </p:pic>
+      <p:pic>
+        <p:nvPicPr>
+          <p:cNvPr id="92" name="Google Shape;92;p13"/>
+          <p:cNvPicPr preferRelativeResize="0"/>
+          <p:nvPr/>
+        </p:nvPicPr>
+        <p:blipFill>
+          <a:blip r:embed="rId3">
+            <a:alphaModFix/>
+          </a:blip>
+          <a:stretch>
+            <a:fillRect/>
+          </a:stretch>
+        </p:blipFill>
+        <p:spPr>
+          <a:xfrm>
+            <a:off x="7846534" y="616067"/>
+            <a:ext cx="464820" cy="609600"/>
+          </a:xfrm>
+          <a:prstGeom prst="rect">
+            <a:avLst/>
+          </a:prstGeom>
+          <a:noFill/>
+          <a:ln>
+            <a:noFill/>
+          </a:ln>
+        </p:spPr>
+      </p:pic>
+      <p:pic>
+        <p:nvPicPr>
+          <p:cNvPr id="93" name="Google Shape;93;p13"/>
+          <p:cNvPicPr preferRelativeResize="0"/>
+          <p:nvPr/>
+        </p:nvPicPr>
+        <p:blipFill>
+          <a:blip r:embed="rId3">
+            <a:alphaModFix/>
+          </a:blip>
+          <a:stretch>
+            <a:fillRect/>
+          </a:stretch>
+        </p:blipFill>
+        <p:spPr>
+          <a:xfrm>
+            <a:off x="7440134" y="1022467"/>
+            <a:ext cx="464820" cy="609600"/>
+          </a:xfrm>
+          <a:prstGeom prst="rect">
+            <a:avLst/>
+          </a:prstGeom>
+          <a:noFill/>
+          <a:ln>
+            <a:noFill/>
+          </a:ln>
+        </p:spPr>
+      </p:pic>
+      <p:pic>
+        <p:nvPicPr>
+          <p:cNvPr id="94" name="Google Shape;94;p13"/>
+          <p:cNvPicPr preferRelativeResize="0"/>
+          <p:nvPr/>
+        </p:nvPicPr>
+        <p:blipFill>
+          <a:blip r:embed="rId3">
+            <a:alphaModFix/>
+          </a:blip>
+          <a:stretch>
+            <a:fillRect/>
+          </a:stretch>
+        </p:blipFill>
+        <p:spPr>
+          <a:xfrm>
+            <a:off x="7846534" y="1327267"/>
+            <a:ext cx="464820" cy="609600"/>
+          </a:xfrm>
+          <a:prstGeom prst="rect">
+            <a:avLst/>
+          </a:prstGeom>
+          <a:noFill/>
+          <a:ln>
+            <a:noFill/>
+          </a:ln>
+        </p:spPr>
+      </p:pic>
+      <p:pic>
+        <p:nvPicPr>
+          <p:cNvPr id="95" name="Google Shape;95;p13"/>
+          <p:cNvPicPr preferRelativeResize="0"/>
+          <p:nvPr/>
+        </p:nvPicPr>
+        <p:blipFill>
+          <a:blip r:embed="rId3">
+            <a:alphaModFix/>
+          </a:blip>
+          <a:stretch>
+            <a:fillRect/>
+          </a:stretch>
+        </p:blipFill>
+        <p:spPr>
+          <a:xfrm>
+            <a:off x="7440134" y="1733667"/>
+            <a:ext cx="464820" cy="609600"/>
+          </a:xfrm>
+          <a:prstGeom prst="rect">
+            <a:avLst/>
+          </a:prstGeom>
+          <a:noFill/>
+          <a:ln>
+            <a:noFill/>
+          </a:ln>
+        </p:spPr>
+      </p:pic>
+      <p:pic>
+        <p:nvPicPr>
+          <p:cNvPr id="96" name="Google Shape;96;p13"/>
+          <p:cNvPicPr preferRelativeResize="0"/>
+          <p:nvPr/>
+        </p:nvPicPr>
+        <p:blipFill>
+          <a:blip r:embed="rId3">
+            <a:alphaModFix/>
+          </a:blip>
+          <a:stretch>
+            <a:fillRect/>
+          </a:stretch>
+        </p:blipFill>
+        <p:spPr>
+          <a:xfrm>
+            <a:off x="7846534" y="2038467"/>
+            <a:ext cx="464820" cy="609600"/>
+          </a:xfrm>
+          <a:prstGeom prst="rect">
+            <a:avLst/>
+          </a:prstGeom>
+          <a:noFill/>
+          <a:ln>
+            <a:noFill/>
+          </a:ln>
+        </p:spPr>
+      </p:pic>
+      <p:pic>
+        <p:nvPicPr>
+          <p:cNvPr id="97" name="Google Shape;97;p13"/>
+          <p:cNvPicPr preferRelativeResize="0"/>
+          <p:nvPr/>
+        </p:nvPicPr>
+        <p:blipFill>
+          <a:blip r:embed="rId3">
+            <a:alphaModFix/>
+          </a:blip>
+          <a:stretch>
+            <a:fillRect/>
+          </a:stretch>
+        </p:blipFill>
+        <p:spPr>
+          <a:xfrm>
+            <a:off x="7440134" y="2444867"/>
+            <a:ext cx="464820" cy="609600"/>
+          </a:xfrm>
+          <a:prstGeom prst="rect">
+            <a:avLst/>
+          </a:prstGeom>
+          <a:noFill/>
+          <a:ln>
+            <a:noFill/>
+          </a:ln>
+        </p:spPr>
+      </p:pic>
+      <p:pic>
+        <p:nvPicPr>
+          <p:cNvPr id="98" name="Google Shape;98;p13"/>
+          <p:cNvPicPr preferRelativeResize="0"/>
+          <p:nvPr/>
+        </p:nvPicPr>
+        <p:blipFill>
+          <a:blip r:embed="rId3">
+            <a:alphaModFix/>
+          </a:blip>
+          <a:stretch>
+            <a:fillRect/>
+          </a:stretch>
+        </p:blipFill>
+        <p:spPr>
+          <a:xfrm>
+            <a:off x="7846534" y="2749667"/>
+            <a:ext cx="464820" cy="609600"/>
+          </a:xfrm>
+          <a:prstGeom prst="rect">
+            <a:avLst/>
+          </a:prstGeom>
+          <a:noFill/>
+          <a:ln>
+            <a:noFill/>
+          </a:ln>
+        </p:spPr>
+      </p:pic>
+      <p:pic>
+        <p:nvPicPr>
+          <p:cNvPr id="99" name="Google Shape;99;p13"/>
+          <p:cNvPicPr preferRelativeResize="0"/>
+          <p:nvPr/>
+        </p:nvPicPr>
+        <p:blipFill>
+          <a:blip r:embed="rId3">
+            <a:alphaModFix/>
+          </a:blip>
+          <a:stretch>
+            <a:fillRect/>
+          </a:stretch>
+        </p:blipFill>
+        <p:spPr>
+          <a:xfrm>
+            <a:off x="7440134" y="3156067"/>
+            <a:ext cx="464820" cy="609600"/>
+          </a:xfrm>
+          <a:prstGeom prst="rect">
+            <a:avLst/>
+          </a:prstGeom>
+          <a:noFill/>
+          <a:ln>
+            <a:noFill/>
+          </a:ln>
+        </p:spPr>
+      </p:pic>
+      <p:pic>
+        <p:nvPicPr>
+          <p:cNvPr id="100" name="Google Shape;100;p13"/>
+          <p:cNvPicPr preferRelativeResize="0"/>
+          <p:nvPr/>
+        </p:nvPicPr>
+        <p:blipFill>
+          <a:blip r:embed="rId3">
+            <a:alphaModFix/>
+          </a:blip>
+          <a:stretch>
+            <a:fillRect/>
+          </a:stretch>
+        </p:blipFill>
+        <p:spPr>
+          <a:xfrm>
+            <a:off x="7846534" y="3460867"/>
+            <a:ext cx="464820" cy="609600"/>
+          </a:xfrm>
+          <a:prstGeom prst="rect">
+            <a:avLst/>
+          </a:prstGeom>
+          <a:noFill/>
+          <a:ln>
+            <a:noFill/>
+          </a:ln>
+        </p:spPr>
+      </p:pic>
+      <p:pic>
+        <p:nvPicPr>
+          <p:cNvPr id="101" name="Google Shape;101;p13"/>
+          <p:cNvPicPr preferRelativeResize="0"/>
+          <p:nvPr/>
+        </p:nvPicPr>
+        <p:blipFill>
+          <a:blip r:embed="rId3">
+            <a:alphaModFix/>
+          </a:blip>
+          <a:stretch>
+            <a:fillRect/>
+          </a:stretch>
+        </p:blipFill>
+        <p:spPr>
+          <a:xfrm>
+            <a:off x="7440134" y="3867267"/>
+            <a:ext cx="464820" cy="609600"/>
+          </a:xfrm>
+          <a:prstGeom prst="rect">
+            <a:avLst/>
+          </a:prstGeom>
+          <a:noFill/>
+          <a:ln>
+            <a:noFill/>
+          </a:ln>
+        </p:spPr>
+      </p:pic>
+      <p:pic>
+        <p:nvPicPr>
+          <p:cNvPr id="102" name="Google Shape;102;p13"/>
+          <p:cNvPicPr preferRelativeResize="0"/>
+          <p:nvPr/>
+        </p:nvPicPr>
+        <p:blipFill>
+          <a:blip r:embed="rId3">
+            <a:alphaModFix/>
+          </a:blip>
+          <a:stretch>
+            <a:fillRect/>
+          </a:stretch>
+        </p:blipFill>
+        <p:spPr>
+          <a:xfrm>
+            <a:off x="7846534" y="4172067"/>
+            <a:ext cx="464820" cy="609600"/>
+          </a:xfrm>
+          <a:prstGeom prst="rect">
+            <a:avLst/>
+          </a:prstGeom>
+          <a:noFill/>
+          <a:ln>
+            <a:noFill/>
+          </a:ln>
+        </p:spPr>
+      </p:pic>
+      <p:pic>
+        <p:nvPicPr>
+          <p:cNvPr id="103" name="Google Shape;103;p13"/>
+          <p:cNvPicPr preferRelativeResize="0"/>
+          <p:nvPr/>
+        </p:nvPicPr>
+        <p:blipFill>
+          <a:blip r:embed="rId3">
+            <a:alphaModFix/>
+          </a:blip>
+          <a:stretch>
+            <a:fillRect/>
+          </a:stretch>
+        </p:blipFill>
+        <p:spPr>
+          <a:xfrm>
+            <a:off x="8311367" y="228600"/>
+            <a:ext cx="464820" cy="609600"/>
+          </a:xfrm>
+          <a:prstGeom prst="rect">
+            <a:avLst/>
+          </a:prstGeom>
+          <a:noFill/>
+          <a:ln>
+            <a:noFill/>
+          </a:ln>
+        </p:spPr>
+      </p:pic>
+      <p:pic>
+        <p:nvPicPr>
+          <p:cNvPr id="104" name="Google Shape;104;p13"/>
+          <p:cNvPicPr preferRelativeResize="0"/>
+          <p:nvPr/>
+        </p:nvPicPr>
+        <p:blipFill>
+          <a:blip r:embed="rId3">
+            <a:alphaModFix/>
+          </a:blip>
+          <a:stretch>
+            <a:fillRect/>
+          </a:stretch>
+        </p:blipFill>
+        <p:spPr>
+          <a:xfrm>
+            <a:off x="8717767" y="533400"/>
+            <a:ext cx="464820" cy="609600"/>
+          </a:xfrm>
+          <a:prstGeom prst="rect">
+            <a:avLst/>
+          </a:prstGeom>
+          <a:noFill/>
+          <a:ln>
+            <a:noFill/>
+          </a:ln>
+        </p:spPr>
+      </p:pic>
+      <p:pic>
+        <p:nvPicPr>
+          <p:cNvPr id="105" name="Google Shape;105;p13"/>
+          <p:cNvPicPr preferRelativeResize="0"/>
+          <p:nvPr/>
+        </p:nvPicPr>
+        <p:blipFill>
+          <a:blip r:embed="rId3">
+            <a:alphaModFix/>
+          </a:blip>
+          <a:stretch>
+            <a:fillRect/>
+          </a:stretch>
+        </p:blipFill>
+        <p:spPr>
+          <a:xfrm>
+            <a:off x="8311367" y="939800"/>
+            <a:ext cx="464820" cy="609600"/>
+          </a:xfrm>
+          <a:prstGeom prst="rect">
+            <a:avLst/>
+          </a:prstGeom>
+          <a:noFill/>
+          <a:ln>
+            <a:noFill/>
+          </a:ln>
+        </p:spPr>
+      </p:pic>
+      <p:pic>
+        <p:nvPicPr>
+          <p:cNvPr id="106" name="Google Shape;106;p13"/>
+          <p:cNvPicPr preferRelativeResize="0"/>
+          <p:nvPr/>
+        </p:nvPicPr>
+        <p:blipFill>
+          <a:blip r:embed="rId3">
+            <a:alphaModFix/>
+          </a:blip>
+          <a:stretch>
+            <a:fillRect/>
+          </a:stretch>
+        </p:blipFill>
+        <p:spPr>
+          <a:xfrm>
+            <a:off x="8717767" y="1244600"/>
+            <a:ext cx="464820" cy="609600"/>
+          </a:xfrm>
+          <a:prstGeom prst="rect">
+            <a:avLst/>
+          </a:prstGeom>
+          <a:noFill/>
+          <a:ln>
+            <a:noFill/>
+          </a:ln>
+        </p:spPr>
+      </p:pic>
+      <p:pic>
+        <p:nvPicPr>
+          <p:cNvPr id="107" name="Google Shape;107;p13"/>
+          <p:cNvPicPr preferRelativeResize="0"/>
+          <p:nvPr/>
+        </p:nvPicPr>
+        <p:blipFill>
+          <a:blip r:embed="rId3">
+            <a:alphaModFix/>
+          </a:blip>
+          <a:stretch>
+            <a:fillRect/>
+          </a:stretch>
+        </p:blipFill>
+        <p:spPr>
+          <a:xfrm>
+            <a:off x="8311367" y="1651000"/>
+            <a:ext cx="464820" cy="609600"/>
+          </a:xfrm>
+          <a:prstGeom prst="rect">
+            <a:avLst/>
+          </a:prstGeom>
+          <a:noFill/>
+          <a:ln>
+            <a:noFill/>
+          </a:ln>
+        </p:spPr>
+      </p:pic>
+      <p:pic>
+        <p:nvPicPr>
+          <p:cNvPr id="108" name="Google Shape;108;p13"/>
+          <p:cNvPicPr preferRelativeResize="0"/>
+          <p:nvPr/>
+        </p:nvPicPr>
+        <p:blipFill>
+          <a:blip r:embed="rId3">
+            <a:alphaModFix/>
+          </a:blip>
+          <a:stretch>
+            <a:fillRect/>
+          </a:stretch>
+        </p:blipFill>
+        <p:spPr>
+          <a:xfrm>
+            <a:off x="8717767" y="1955800"/>
+            <a:ext cx="464820" cy="609600"/>
+          </a:xfrm>
+          <a:prstGeom prst="rect">
+            <a:avLst/>
+          </a:prstGeom>
+          <a:noFill/>
+          <a:ln>
+            <a:noFill/>
+          </a:ln>
+        </p:spPr>
+      </p:pic>
+      <p:pic>
+        <p:nvPicPr>
+          <p:cNvPr id="109" name="Google Shape;109;p13"/>
+          <p:cNvPicPr preferRelativeResize="0"/>
+          <p:nvPr/>
+        </p:nvPicPr>
+        <p:blipFill>
+          <a:blip r:embed="rId3">
+            <a:alphaModFix/>
+          </a:blip>
+          <a:stretch>
+            <a:fillRect/>
+          </a:stretch>
+        </p:blipFill>
+        <p:spPr>
+          <a:xfrm>
+            <a:off x="8311367" y="2362200"/>
+            <a:ext cx="464820" cy="609600"/>
+          </a:xfrm>
+          <a:prstGeom prst="rect">
+            <a:avLst/>
+          </a:prstGeom>
+          <a:noFill/>
+          <a:ln>
+            <a:noFill/>
+          </a:ln>
+        </p:spPr>
+      </p:pic>
+      <p:pic>
+        <p:nvPicPr>
+          <p:cNvPr id="110" name="Google Shape;110;p13"/>
+          <p:cNvPicPr preferRelativeResize="0"/>
+          <p:nvPr/>
+        </p:nvPicPr>
+        <p:blipFill>
+          <a:blip r:embed="rId3">
+            <a:alphaModFix/>
+          </a:blip>
+          <a:stretch>
+            <a:fillRect/>
+          </a:stretch>
+        </p:blipFill>
+        <p:spPr>
+          <a:xfrm>
+            <a:off x="8717767" y="2667000"/>
+            <a:ext cx="464820" cy="609600"/>
+          </a:xfrm>
+          <a:prstGeom prst="rect">
+            <a:avLst/>
+          </a:prstGeom>
+          <a:noFill/>
+          <a:ln>
+            <a:noFill/>
+          </a:ln>
+        </p:spPr>
+      </p:pic>
+      <p:pic>
+        <p:nvPicPr>
+          <p:cNvPr id="111" name="Google Shape;111;p13"/>
+          <p:cNvPicPr preferRelativeResize="0"/>
+          <p:nvPr/>
+        </p:nvPicPr>
+        <p:blipFill>
+          <a:blip r:embed="rId3">
+            <a:alphaModFix/>
+          </a:blip>
+          <a:stretch>
+            <a:fillRect/>
+          </a:stretch>
+        </p:blipFill>
+        <p:spPr>
+          <a:xfrm>
+            <a:off x="8311367" y="3073400"/>
+            <a:ext cx="464820" cy="609600"/>
+          </a:xfrm>
+          <a:prstGeom prst="rect">
+            <a:avLst/>
+          </a:prstGeom>
+          <a:noFill/>
+          <a:ln>
+            <a:noFill/>
+          </a:ln>
+        </p:spPr>
+      </p:pic>
+      <p:pic>
+        <p:nvPicPr>
+          <p:cNvPr id="112" name="Google Shape;112;p13"/>
+          <p:cNvPicPr preferRelativeResize="0"/>
+          <p:nvPr/>
+        </p:nvPicPr>
+        <p:blipFill>
+          <a:blip r:embed="rId3">
+            <a:alphaModFix/>
+          </a:blip>
+          <a:stretch>
+            <a:fillRect/>
+          </a:stretch>
+        </p:blipFill>
+        <p:spPr>
+          <a:xfrm>
+            <a:off x="8717767" y="3378200"/>
+            <a:ext cx="464820" cy="609600"/>
+          </a:xfrm>
+          <a:prstGeom prst="rect">
+            <a:avLst/>
+          </a:prstGeom>
+          <a:noFill/>
+          <a:ln>
+            <a:noFill/>
+          </a:ln>
+        </p:spPr>
+      </p:pic>
+      <p:pic>
+        <p:nvPicPr>
+          <p:cNvPr id="113" name="Google Shape;113;p13"/>
+          <p:cNvPicPr preferRelativeResize="0"/>
+          <p:nvPr/>
+        </p:nvPicPr>
+        <p:blipFill>
+          <a:blip r:embed="rId3">
+            <a:alphaModFix/>
+          </a:blip>
+          <a:stretch>
+            <a:fillRect/>
+          </a:stretch>
+        </p:blipFill>
+        <p:spPr>
+          <a:xfrm>
+            <a:off x="8311367" y="3784600"/>
+            <a:ext cx="464820" cy="609600"/>
+          </a:xfrm>
+          <a:prstGeom prst="rect">
+            <a:avLst/>
+          </a:prstGeom>
+          <a:noFill/>
+          <a:ln>
+            <a:noFill/>
+          </a:ln>
+        </p:spPr>
+      </p:pic>
+      <p:pic>
+        <p:nvPicPr>
+          <p:cNvPr id="114" name="Google Shape;114;p13"/>
+          <p:cNvPicPr preferRelativeResize="0"/>
+          <p:nvPr/>
+        </p:nvPicPr>
+        <p:blipFill>
+          <a:blip r:embed="rId3">
+            <a:alphaModFix/>
+          </a:blip>
+          <a:stretch>
+            <a:fillRect/>
+          </a:stretch>
+        </p:blipFill>
+        <p:spPr>
+          <a:xfrm>
+            <a:off x="8717767" y="4089400"/>
+            <a:ext cx="464820" cy="609600"/>
+          </a:xfrm>
+          <a:prstGeom prst="rect">
+            <a:avLst/>
+          </a:prstGeom>
+          <a:noFill/>
+          <a:ln>
+            <a:noFill/>
+          </a:ln>
+        </p:spPr>
+      </p:pic>
+      <p:pic>
+        <p:nvPicPr>
+          <p:cNvPr id="115" name="Google Shape;115;p13"/>
+          <p:cNvPicPr preferRelativeResize="0"/>
+          <p:nvPr/>
+        </p:nvPicPr>
+        <p:blipFill>
+          <a:blip r:embed="rId3">
+            <a:alphaModFix/>
+          </a:blip>
+          <a:stretch>
+            <a:fillRect/>
+          </a:stretch>
+        </p:blipFill>
+        <p:spPr>
+          <a:xfrm>
+            <a:off x="9182601" y="378000"/>
+            <a:ext cx="464820" cy="609600"/>
+          </a:xfrm>
+          <a:prstGeom prst="rect">
+            <a:avLst/>
+          </a:prstGeom>
+          <a:noFill/>
+          <a:ln>
+            <a:noFill/>
+          </a:ln>
+        </p:spPr>
+      </p:pic>
+      <p:pic>
+        <p:nvPicPr>
+          <p:cNvPr id="116" name="Google Shape;116;p13"/>
+          <p:cNvPicPr preferRelativeResize="0"/>
+          <p:nvPr/>
+        </p:nvPicPr>
+        <p:blipFill>
+          <a:blip r:embed="rId3">
+            <a:alphaModFix/>
+          </a:blip>
+          <a:stretch>
+            <a:fillRect/>
+          </a:stretch>
+        </p:blipFill>
+        <p:spPr>
+          <a:xfrm>
+            <a:off x="9589001" y="682800"/>
+            <a:ext cx="464820" cy="609600"/>
+          </a:xfrm>
+          <a:prstGeom prst="rect">
+            <a:avLst/>
+          </a:prstGeom>
+          <a:noFill/>
+          <a:ln>
+            <a:noFill/>
+          </a:ln>
+        </p:spPr>
+      </p:pic>
+      <p:pic>
+        <p:nvPicPr>
+          <p:cNvPr id="117" name="Google Shape;117;p13"/>
+          <p:cNvPicPr preferRelativeResize="0"/>
+          <p:nvPr/>
+        </p:nvPicPr>
+        <p:blipFill>
+          <a:blip r:embed="rId3">
+            <a:alphaModFix/>
+          </a:blip>
+          <a:stretch>
+            <a:fillRect/>
+          </a:stretch>
+        </p:blipFill>
+        <p:spPr>
+          <a:xfrm>
+            <a:off x="9182601" y="1089200"/>
+            <a:ext cx="464820" cy="609600"/>
+          </a:xfrm>
+          <a:prstGeom prst="rect">
+            <a:avLst/>
+          </a:prstGeom>
+          <a:noFill/>
+          <a:ln>
+            <a:noFill/>
+          </a:ln>
+        </p:spPr>
+      </p:pic>
+      <p:pic>
+        <p:nvPicPr>
+          <p:cNvPr id="118" name="Google Shape;118;p13"/>
+          <p:cNvPicPr preferRelativeResize="0"/>
+          <p:nvPr/>
+        </p:nvPicPr>
+        <p:blipFill>
+          <a:blip r:embed="rId3">
+            <a:alphaModFix/>
+          </a:blip>
+          <a:stretch>
+            <a:fillRect/>
+          </a:stretch>
+        </p:blipFill>
+        <p:spPr>
+          <a:xfrm>
+            <a:off x="9589001" y="1394000"/>
+            <a:ext cx="464820" cy="609600"/>
+          </a:xfrm>
+          <a:prstGeom prst="rect">
+            <a:avLst/>
+          </a:prstGeom>
+          <a:noFill/>
+          <a:ln>
+            <a:noFill/>
+          </a:ln>
+        </p:spPr>
+      </p:pic>
+      <p:pic>
+        <p:nvPicPr>
+          <p:cNvPr id="119" name="Google Shape;119;p13"/>
+          <p:cNvPicPr preferRelativeResize="0"/>
+          <p:nvPr/>
+        </p:nvPicPr>
+        <p:blipFill>
+          <a:blip r:embed="rId3">
+            <a:alphaModFix/>
+          </a:blip>
+          <a:stretch>
+            <a:fillRect/>
+          </a:stretch>
+        </p:blipFill>
+        <p:spPr>
+          <a:xfrm>
+            <a:off x="9182601" y="1800400"/>
+            <a:ext cx="464820" cy="609600"/>
+          </a:xfrm>
+          <a:prstGeom prst="rect">
+            <a:avLst/>
+          </a:prstGeom>
+          <a:noFill/>
+          <a:ln>
+            <a:noFill/>
+          </a:ln>
+        </p:spPr>
+      </p:pic>
+      <p:pic>
+        <p:nvPicPr>
+          <p:cNvPr id="120" name="Google Shape;120;p13"/>
+          <p:cNvPicPr preferRelativeResize="0"/>
+          <p:nvPr/>
+        </p:nvPicPr>
+        <p:blipFill>
+          <a:blip r:embed="rId3">
+            <a:alphaModFix/>
+          </a:blip>
+          <a:stretch>
+            <a:fillRect/>
+          </a:stretch>
+        </p:blipFill>
+        <p:spPr>
+          <a:xfrm>
+            <a:off x="9589001" y="2105200"/>
+            <a:ext cx="464820" cy="609600"/>
+          </a:xfrm>
+          <a:prstGeom prst="rect">
+            <a:avLst/>
+          </a:prstGeom>
+          <a:noFill/>
+          <a:ln>
+            <a:noFill/>
+          </a:ln>
+        </p:spPr>
+      </p:pic>
+      <p:pic>
+        <p:nvPicPr>
+          <p:cNvPr id="121" name="Google Shape;121;p13"/>
+          <p:cNvPicPr preferRelativeResize="0"/>
+          <p:nvPr/>
+        </p:nvPicPr>
+        <p:blipFill>
+          <a:blip r:embed="rId3">
+            <a:alphaModFix/>
+          </a:blip>
+          <a:stretch>
+            <a:fillRect/>
+          </a:stretch>
+        </p:blipFill>
+        <p:spPr>
+          <a:xfrm>
+            <a:off x="9182601" y="2511600"/>
+            <a:ext cx="464820" cy="609600"/>
+          </a:xfrm>
+          <a:prstGeom prst="rect">
+            <a:avLst/>
+          </a:prstGeom>
+          <a:noFill/>
+          <a:ln>
+            <a:noFill/>
+          </a:ln>
+        </p:spPr>
+      </p:pic>
+      <p:pic>
+        <p:nvPicPr>
+          <p:cNvPr id="122" name="Google Shape;122;p13"/>
+          <p:cNvPicPr preferRelativeResize="0"/>
+          <p:nvPr/>
+        </p:nvPicPr>
+        <p:blipFill>
+          <a:blip r:embed="rId3">
+            <a:alphaModFix/>
+          </a:blip>
+          <a:stretch>
+            <a:fillRect/>
+          </a:stretch>
+        </p:blipFill>
+        <p:spPr>
+          <a:xfrm>
+            <a:off x="9589001" y="2816400"/>
+            <a:ext cx="464820" cy="609600"/>
+          </a:xfrm>
+          <a:prstGeom prst="rect">
+            <a:avLst/>
+          </a:prstGeom>
+          <a:noFill/>
+          <a:ln>
+            <a:noFill/>
+          </a:ln>
+        </p:spPr>
+      </p:pic>
+      <p:pic>
+        <p:nvPicPr>
+          <p:cNvPr id="123" name="Google Shape;123;p13"/>
+          <p:cNvPicPr preferRelativeResize="0"/>
+          <p:nvPr/>
+        </p:nvPicPr>
+        <p:blipFill>
+          <a:blip r:embed="rId3">
+            <a:alphaModFix/>
+          </a:blip>
+          <a:stretch>
+            <a:fillRect/>
+          </a:stretch>
+        </p:blipFill>
+        <p:spPr>
+          <a:xfrm>
+            <a:off x="9182601" y="3222800"/>
+            <a:ext cx="464820" cy="609600"/>
+          </a:xfrm>
+          <a:prstGeom prst="rect">
+            <a:avLst/>
+          </a:prstGeom>
+          <a:noFill/>
+          <a:ln>
+            <a:noFill/>
+          </a:ln>
+        </p:spPr>
+      </p:pic>
+      <p:pic>
+        <p:nvPicPr>
+          <p:cNvPr id="124" name="Google Shape;124;p13"/>
+          <p:cNvPicPr preferRelativeResize="0"/>
+          <p:nvPr/>
+        </p:nvPicPr>
+        <p:blipFill>
+          <a:blip r:embed="rId3">
+            <a:alphaModFix/>
+          </a:blip>
+          <a:stretch>
+            <a:fillRect/>
+          </a:stretch>
+        </p:blipFill>
+        <p:spPr>
+          <a:xfrm>
+            <a:off x="9589001" y="3527600"/>
+            <a:ext cx="464820" cy="609600"/>
+          </a:xfrm>
+          <a:prstGeom prst="rect">
+            <a:avLst/>
+          </a:prstGeom>
+          <a:noFill/>
+          <a:ln>
+            <a:noFill/>
+          </a:ln>
+        </p:spPr>
+      </p:pic>
+      <p:pic>
+        <p:nvPicPr>
+          <p:cNvPr id="125" name="Google Shape;125;p13"/>
+          <p:cNvPicPr preferRelativeResize="0"/>
+          <p:nvPr/>
+        </p:nvPicPr>
+        <p:blipFill>
+          <a:blip r:embed="rId3">
+            <a:alphaModFix/>
+          </a:blip>
+          <a:stretch>
+            <a:fillRect/>
+          </a:stretch>
+        </p:blipFill>
+        <p:spPr>
+          <a:xfrm>
+            <a:off x="9182601" y="3934000"/>
+            <a:ext cx="464820" cy="609600"/>
+          </a:xfrm>
+          <a:prstGeom prst="rect">
+            <a:avLst/>
+          </a:prstGeom>
+          <a:noFill/>
+          <a:ln>
+            <a:noFill/>
+          </a:ln>
+        </p:spPr>
+      </p:pic>
+      <p:pic>
+        <p:nvPicPr>
+          <p:cNvPr id="126" name="Google Shape;126;p13"/>
+          <p:cNvPicPr preferRelativeResize="0"/>
+          <p:nvPr/>
+        </p:nvPicPr>
+        <p:blipFill>
+          <a:blip r:embed="rId3">
+            <a:alphaModFix/>
+          </a:blip>
+          <a:stretch>
+            <a:fillRect/>
+          </a:stretch>
+        </p:blipFill>
+        <p:spPr>
+          <a:xfrm>
+            <a:off x="9589001" y="4238800"/>
+            <a:ext cx="464820" cy="609600"/>
+          </a:xfrm>
+          <a:prstGeom prst="rect">
+            <a:avLst/>
+          </a:prstGeom>
+          <a:noFill/>
+          <a:ln>
+            <a:noFill/>
+          </a:ln>
+        </p:spPr>
+      </p:pic>
+      <p:pic>
+        <p:nvPicPr>
+          <p:cNvPr id="127" name="Google Shape;127;p13"/>
+          <p:cNvPicPr preferRelativeResize="0"/>
+          <p:nvPr/>
+        </p:nvPicPr>
+        <p:blipFill>
+          <a:blip r:embed="rId3">
+            <a:alphaModFix/>
+          </a:blip>
+          <a:stretch>
+            <a:fillRect/>
+          </a:stretch>
+        </p:blipFill>
+        <p:spPr>
+          <a:xfrm>
+            <a:off x="10053834" y="295333"/>
+            <a:ext cx="464820" cy="609600"/>
+          </a:xfrm>
+          <a:prstGeom prst="rect">
+            <a:avLst/>
+          </a:prstGeom>
+          <a:noFill/>
+          <a:ln>
+            <a:noFill/>
+          </a:ln>
+        </p:spPr>
+      </p:pic>
+      <p:pic>
+        <p:nvPicPr>
+          <p:cNvPr id="128" name="Google Shape;128;p13"/>
+          <p:cNvPicPr preferRelativeResize="0"/>
+          <p:nvPr/>
+        </p:nvPicPr>
+        <p:blipFill>
+          <a:blip r:embed="rId3">
+            <a:alphaModFix/>
+          </a:blip>
+          <a:stretch>
+            <a:fillRect/>
+          </a:stretch>
+        </p:blipFill>
+        <p:spPr>
+          <a:xfrm>
+            <a:off x="10460234" y="600133"/>
+            <a:ext cx="464820" cy="609600"/>
+          </a:xfrm>
+          <a:prstGeom prst="rect">
+            <a:avLst/>
+          </a:prstGeom>
+          <a:noFill/>
+          <a:ln>
+            <a:noFill/>
+          </a:ln>
+        </p:spPr>
+      </p:pic>
+      <p:pic>
+        <p:nvPicPr>
+          <p:cNvPr id="129" name="Google Shape;129;p13"/>
+          <p:cNvPicPr preferRelativeResize="0"/>
+          <p:nvPr/>
+        </p:nvPicPr>
+        <p:blipFill>
+          <a:blip r:embed="rId3">
+            <a:alphaModFix/>
+          </a:blip>
+          <a:stretch>
+            <a:fillRect/>
+          </a:stretch>
+        </p:blipFill>
+        <p:spPr>
+          <a:xfrm>
+            <a:off x="10053834" y="1006533"/>
+            <a:ext cx="464820" cy="609600"/>
+          </a:xfrm>
+          <a:prstGeom prst="rect">
+            <a:avLst/>
+          </a:prstGeom>
+          <a:noFill/>
+          <a:ln>
+            <a:noFill/>
+          </a:ln>
+        </p:spPr>
+      </p:pic>
+      <p:pic>
+        <p:nvPicPr>
+          <p:cNvPr id="130" name="Google Shape;130;p13"/>
+          <p:cNvPicPr preferRelativeResize="0"/>
+          <p:nvPr/>
+        </p:nvPicPr>
+        <p:blipFill>
+          <a:blip r:embed="rId3">
+            <a:alphaModFix/>
+          </a:blip>
+          <a:stretch>
+            <a:fillRect/>
+          </a:stretch>
+        </p:blipFill>
+        <p:spPr>
+          <a:xfrm>
+            <a:off x="10460234" y="1311333"/>
+            <a:ext cx="464820" cy="609600"/>
+          </a:xfrm>
+          <a:prstGeom prst="rect">
+            <a:avLst/>
+          </a:prstGeom>
+          <a:noFill/>
+          <a:ln>
+            <a:noFill/>
+          </a:ln>
+        </p:spPr>
+      </p:pic>
+      <p:pic>
+        <p:nvPicPr>
+          <p:cNvPr id="131" name="Google Shape;131;p13"/>
+          <p:cNvPicPr preferRelativeResize="0"/>
+          <p:nvPr/>
+        </p:nvPicPr>
+        <p:blipFill>
+          <a:blip r:embed="rId3">
+            <a:alphaModFix/>
+          </a:blip>
+          <a:stretch>
+            <a:fillRect/>
+          </a:stretch>
+        </p:blipFill>
+        <p:spPr>
+          <a:xfrm>
+            <a:off x="10053834" y="1717733"/>
+            <a:ext cx="464820" cy="609600"/>
+          </a:xfrm>
+          <a:prstGeom prst="rect">
+            <a:avLst/>
+          </a:prstGeom>
+          <a:noFill/>
+          <a:ln>
+            <a:noFill/>
+          </a:ln>
+        </p:spPr>
+      </p:pic>
+      <p:pic>
+        <p:nvPicPr>
+          <p:cNvPr id="132" name="Google Shape;132;p13"/>
+          <p:cNvPicPr preferRelativeResize="0"/>
+          <p:nvPr/>
+        </p:nvPicPr>
+        <p:blipFill>
+          <a:blip r:embed="rId3">
+            <a:alphaModFix/>
+          </a:blip>
+          <a:stretch>
+            <a:fillRect/>
+          </a:stretch>
+        </p:blipFill>
+        <p:spPr>
+          <a:xfrm>
+            <a:off x="10460234" y="2022533"/>
+            <a:ext cx="464820" cy="609600"/>
+          </a:xfrm>
+          <a:prstGeom prst="rect">
+            <a:avLst/>
+          </a:prstGeom>
+          <a:noFill/>
+          <a:ln>
+            <a:noFill/>
+          </a:ln>
+        </p:spPr>
+      </p:pic>
+      <p:pic>
+        <p:nvPicPr>
+          <p:cNvPr id="133" name="Google Shape;133;p13"/>
+          <p:cNvPicPr preferRelativeResize="0"/>
+          <p:nvPr/>
+        </p:nvPicPr>
+        <p:blipFill>
+          <a:blip r:embed="rId3">
+            <a:alphaModFix/>
+          </a:blip>
+          <a:stretch>
+            <a:fillRect/>
+          </a:stretch>
+        </p:blipFill>
+        <p:spPr>
+          <a:xfrm>
+            <a:off x="10053834" y="2428933"/>
+            <a:ext cx="464820" cy="609600"/>
+          </a:xfrm>
+          <a:prstGeom prst="rect">
+            <a:avLst/>
+          </a:prstGeom>
+          <a:noFill/>
+          <a:ln>
+            <a:noFill/>
+          </a:ln>
+        </p:spPr>
+      </p:pic>
+      <p:pic>
+        <p:nvPicPr>
+          <p:cNvPr id="134" name="Google Shape;134;p13"/>
+          <p:cNvPicPr preferRelativeResize="0"/>
+          <p:nvPr/>
+        </p:nvPicPr>
+        <p:blipFill>
+          <a:blip r:embed="rId3">
+            <a:alphaModFix/>
+          </a:blip>
+          <a:stretch>
+            <a:fillRect/>
+          </a:stretch>
+        </p:blipFill>
+        <p:spPr>
+          <a:xfrm>
+            <a:off x="10460234" y="2733733"/>
+            <a:ext cx="464820" cy="609600"/>
+          </a:xfrm>
+          <a:prstGeom prst="rect">
+            <a:avLst/>
+          </a:prstGeom>
+          <a:noFill/>
+          <a:ln>
+            <a:noFill/>
+          </a:ln>
+        </p:spPr>
+      </p:pic>
+      <p:pic>
+        <p:nvPicPr>
+          <p:cNvPr id="135" name="Google Shape;135;p13"/>
+          <p:cNvPicPr preferRelativeResize="0"/>
+          <p:nvPr/>
+        </p:nvPicPr>
+        <p:blipFill>
+          <a:blip r:embed="rId3">
+            <a:alphaModFix/>
+          </a:blip>
+          <a:stretch>
+            <a:fillRect/>
+          </a:stretch>
+        </p:blipFill>
+        <p:spPr>
+          <a:xfrm>
+            <a:off x="10053834" y="3140133"/>
+            <a:ext cx="464820" cy="609600"/>
+          </a:xfrm>
+          <a:prstGeom prst="rect">
+            <a:avLst/>
+          </a:prstGeom>
+          <a:noFill/>
+          <a:ln>
+            <a:noFill/>
+          </a:ln>
+        </p:spPr>
+      </p:pic>
+      <p:pic>
+        <p:nvPicPr>
+          <p:cNvPr id="136" name="Google Shape;136;p13"/>
+          <p:cNvPicPr preferRelativeResize="0"/>
+          <p:nvPr/>
+        </p:nvPicPr>
+        <p:blipFill>
+          <a:blip r:embed="rId3">
+            <a:alphaModFix/>
+          </a:blip>
+          <a:stretch>
+            <a:fillRect/>
+          </a:stretch>
+        </p:blipFill>
+        <p:spPr>
+          <a:xfrm>
+            <a:off x="10460234" y="3444933"/>
+            <a:ext cx="464820" cy="609600"/>
+          </a:xfrm>
+          <a:prstGeom prst="rect">
+            <a:avLst/>
+          </a:prstGeom>
+          <a:noFill/>
+          <a:ln>
+            <a:noFill/>
+          </a:ln>
+        </p:spPr>
+      </p:pic>
+      <p:pic>
+        <p:nvPicPr>
+          <p:cNvPr id="137" name="Google Shape;137;p13"/>
+          <p:cNvPicPr preferRelativeResize="0"/>
+          <p:nvPr/>
+        </p:nvPicPr>
+        <p:blipFill>
+          <a:blip r:embed="rId3">
+            <a:alphaModFix/>
+          </a:blip>
+          <a:stretch>
+            <a:fillRect/>
+          </a:stretch>
+        </p:blipFill>
+        <p:spPr>
+          <a:xfrm>
+            <a:off x="10053834" y="3851333"/>
+            <a:ext cx="464820" cy="609600"/>
+          </a:xfrm>
+          <a:prstGeom prst="rect">
+            <a:avLst/>
+          </a:prstGeom>
+          <a:noFill/>
+          <a:ln>
+            <a:noFill/>
+          </a:ln>
+        </p:spPr>
+      </p:pic>
+      <p:pic>
+        <p:nvPicPr>
+          <p:cNvPr id="138" name="Google Shape;138;p13"/>
+          <p:cNvPicPr preferRelativeResize="0"/>
+          <p:nvPr/>
+        </p:nvPicPr>
+        <p:blipFill>
+          <a:blip r:embed="rId3">
+            <a:alphaModFix/>
+          </a:blip>
+          <a:stretch>
+            <a:fillRect/>
+          </a:stretch>
+        </p:blipFill>
+        <p:spPr>
+          <a:xfrm>
+            <a:off x="10460234" y="4156133"/>
+            <a:ext cx="464820" cy="609600"/>
+          </a:xfrm>
+          <a:prstGeom prst="rect">
+            <a:avLst/>
+          </a:prstGeom>
+          <a:noFill/>
+          <a:ln>
+            <a:noFill/>
+          </a:ln>
+        </p:spPr>
+      </p:pic>
+      <p:sp>
+        <p:nvSpPr>
+          <p:cNvPr id="139" name="Google Shape;139;p13"/>
+          <p:cNvSpPr txBox="1"/>
+          <p:nvPr/>
+        </p:nvSpPr>
+        <p:spPr>
+          <a:xfrm>
+            <a:off x="962133" y="5146733"/>
+            <a:ext cx="464800" cy="533600"/>
+          </a:xfrm>
+          <a:prstGeom prst="rect">
+            <a:avLst/>
+          </a:prstGeom>
+          <a:noFill/>
+          <a:ln>
+            <a:noFill/>
+          </a:ln>
+        </p:spPr>
+        <p:txBody>
+          <a:bodyPr spcFirstLastPara="1" wrap="square" lIns="121900" tIns="121900" rIns="121900" bIns="121900" anchor="ctr" anchorCtr="0">
+            <a:noAutofit/>
+          </a:bodyPr>
           <a:lstStyle/>
           <a:p>
-            <a:pPr algn="ctr"/>
             <a:r>
-              <a:rPr lang="en-US" dirty="0"/>
-              <a:t>What is the difference between log2 and lo10?</a:t>
+              <a:rPr lang="en" sz="2400"/>
+              <a:t>1</a:t>
             </a:r>
-          </a:p>
-        </p:txBody>
-      </p:sp>
+            <a:endParaRPr sz="2400"/>
+          </a:p>
+        </p:txBody>
+      </p:sp>
+      <p:sp>
+        <p:nvSpPr>
+          <p:cNvPr id="140" name="Google Shape;140;p13"/>
+          <p:cNvSpPr txBox="1"/>
+          <p:nvPr/>
+        </p:nvSpPr>
+        <p:spPr>
+          <a:xfrm>
+            <a:off x="3019533" y="5146733"/>
+            <a:ext cx="1041600" cy="533600"/>
+          </a:xfrm>
+          <a:prstGeom prst="rect">
+            <a:avLst/>
+          </a:prstGeom>
+          <a:noFill/>
+          <a:ln>
+            <a:noFill/>
+          </a:ln>
+        </p:spPr>
+        <p:txBody>
+          <a:bodyPr spcFirstLastPara="1" wrap="square" lIns="121900" tIns="121900" rIns="121900" bIns="121900" anchor="ctr" anchorCtr="0">
+            <a:noAutofit/>
+          </a:bodyPr>
+          <a:lstStyle/>
+          <a:p>
+            <a:r>
+              <a:rPr lang="en" sz="2400"/>
+              <a:t>12</a:t>
+            </a:r>
+            <a:endParaRPr sz="2400"/>
+          </a:p>
+        </p:txBody>
+      </p:sp>
+      <p:sp>
+        <p:nvSpPr>
+          <p:cNvPr id="141" name="Google Shape;141;p13"/>
+          <p:cNvSpPr txBox="1"/>
+          <p:nvPr/>
+        </p:nvSpPr>
+        <p:spPr>
+          <a:xfrm>
+            <a:off x="5450533" y="5146733"/>
+            <a:ext cx="1041600" cy="533600"/>
+          </a:xfrm>
+          <a:prstGeom prst="rect">
+            <a:avLst/>
+          </a:prstGeom>
+          <a:noFill/>
+          <a:ln>
+            <a:noFill/>
+          </a:ln>
+        </p:spPr>
+        <p:txBody>
+          <a:bodyPr spcFirstLastPara="1" wrap="square" lIns="121900" tIns="121900" rIns="121900" bIns="121900" anchor="ctr" anchorCtr="0">
+            <a:noAutofit/>
+          </a:bodyPr>
+          <a:lstStyle/>
+          <a:p>
+            <a:r>
+              <a:rPr lang="en" sz="2400"/>
+              <a:t>24</a:t>
+            </a:r>
+            <a:endParaRPr sz="2400"/>
+          </a:p>
+        </p:txBody>
+      </p:sp>
+      <p:sp>
+        <p:nvSpPr>
+          <p:cNvPr id="142" name="Google Shape;142;p13"/>
+          <p:cNvSpPr txBox="1"/>
+          <p:nvPr/>
+        </p:nvSpPr>
+        <p:spPr>
+          <a:xfrm>
+            <a:off x="8717767" y="5146733"/>
+            <a:ext cx="1041600" cy="533600"/>
+          </a:xfrm>
+          <a:prstGeom prst="rect">
+            <a:avLst/>
+          </a:prstGeom>
+          <a:noFill/>
+          <a:ln>
+            <a:noFill/>
+          </a:ln>
+        </p:spPr>
+        <p:txBody>
+          <a:bodyPr spcFirstLastPara="1" wrap="square" lIns="121900" tIns="121900" rIns="121900" bIns="121900" anchor="ctr" anchorCtr="0">
+            <a:noAutofit/>
+          </a:bodyPr>
+          <a:lstStyle/>
+          <a:p>
+            <a:r>
+              <a:rPr lang="en" sz="2400"/>
+              <a:t>48</a:t>
+            </a:r>
+            <a:endParaRPr sz="2400"/>
+          </a:p>
+        </p:txBody>
+      </p:sp>
+      <p:grpSp>
+        <p:nvGrpSpPr>
+          <p:cNvPr id="143" name="Google Shape;143;p13"/>
+          <p:cNvGrpSpPr/>
+          <p:nvPr/>
+        </p:nvGrpSpPr>
+        <p:grpSpPr>
+          <a:xfrm>
+            <a:off x="126937" y="6305663"/>
+            <a:ext cx="7574831" cy="480000"/>
+            <a:chOff x="384875" y="811479"/>
+            <a:chExt cx="5681123" cy="360000"/>
+          </a:xfrm>
+        </p:grpSpPr>
+        <p:pic>
+          <p:nvPicPr>
+            <p:cNvPr id="144" name="Google Shape;144;p13" descr="Arrow: Slight curve"/>
+            <p:cNvPicPr preferRelativeResize="0"/>
+            <p:nvPr/>
+          </p:nvPicPr>
+          <p:blipFill rotWithShape="1">
+            <a:blip r:embed="rId4">
+              <a:alphaModFix/>
+            </a:blip>
+            <a:srcRect/>
+            <a:stretch/>
+          </p:blipFill>
+          <p:spPr>
+            <a:xfrm>
+              <a:off x="384875" y="811479"/>
+              <a:ext cx="360000" cy="360000"/>
+            </a:xfrm>
+            <a:prstGeom prst="rect">
+              <a:avLst/>
+            </a:prstGeom>
+            <a:noFill/>
+            <a:ln>
+              <a:noFill/>
+            </a:ln>
+          </p:spPr>
+        </p:pic>
+        <p:sp>
+          <p:nvSpPr>
+            <p:cNvPr id="145" name="Google Shape;145;p13"/>
+            <p:cNvSpPr txBox="1"/>
+            <p:nvPr/>
+          </p:nvSpPr>
+          <p:spPr>
+            <a:xfrm>
+              <a:off x="761998" y="838200"/>
+              <a:ext cx="5304000" cy="306600"/>
+            </a:xfrm>
+            <a:prstGeom prst="rect">
+              <a:avLst/>
+            </a:prstGeom>
+            <a:noFill/>
+            <a:ln>
+              <a:noFill/>
+            </a:ln>
+          </p:spPr>
+          <p:txBody>
+            <a:bodyPr spcFirstLastPara="1" wrap="square" lIns="121900" tIns="60933" rIns="121900" bIns="60933" anchor="t" anchorCtr="0">
+              <a:normAutofit fontScale="92500"/>
+            </a:bodyPr>
+            <a:lstStyle/>
+            <a:p>
+              <a:pPr>
+                <a:buClr>
+                  <a:srgbClr val="000000"/>
+                </a:buClr>
+                <a:buSzPts val="1600"/>
+              </a:pPr>
+              <a:r>
+                <a:rPr lang="en" sz="2133">
+                  <a:latin typeface="Cambria"/>
+                  <a:ea typeface="Cambria"/>
+                  <a:cs typeface="Cambria"/>
+                  <a:sym typeface="Cambria"/>
+                </a:rPr>
+                <a:t>Log2 or log10?</a:t>
+              </a:r>
+              <a:endParaRPr sz="2133">
+                <a:solidFill>
+                  <a:srgbClr val="000000"/>
+                </a:solidFill>
+                <a:latin typeface="Cambria"/>
+                <a:ea typeface="Cambria"/>
+                <a:cs typeface="Cambria"/>
+                <a:sym typeface="Cambria"/>
+              </a:endParaRPr>
+            </a:p>
+          </p:txBody>
+        </p:sp>
+      </p:grpSp>
     </p:spTree>
     <p:extLst>
       <p:ext uri="{BB962C8B-B14F-4D97-AF65-F5344CB8AC3E}">
-        <p14:creationId xmlns:p14="http://schemas.microsoft.com/office/powerpoint/2010/main" val="3130578716"/>
+        <p14:creationId xmlns:p14="http://schemas.microsoft.com/office/powerpoint/2010/main" val="4064933883"/>
       </p:ext>
     </p:extLst>
   </p:cSld>
   <p:clrMapOvr>
     <a:masterClrMapping/>
   </p:clrMapOvr>
+  <p:timing>
+    <p:tnLst>
+      <p:par>
+        <p:cTn id="1" dur="indefinite" restart="never" nodeType="tmRoot">
+          <p:childTnLst>
+            <p:seq concurrent="1" nextAc="seek">
+              <p:cTn id="2" dur="indefinite" nodeType="mainSeq">
+                <p:childTnLst>
+                  <p:par>
+                    <p:cTn id="3" fill="hold">
+                      <p:stCondLst>
+                        <p:cond delay="indefinite"/>
+                      </p:stCondLst>
+                      <p:childTnLst>
+                        <p:par>
+                          <p:cTn id="4" fill="hold">
+                            <p:stCondLst>
+                              <p:cond delay="0"/>
+                            </p:stCondLst>
+                            <p:childTnLst>
+                              <p:par>
+                                <p:cTn id="5" presetID="1" presetClass="entr" presetSubtype="0" fill="hold" nodeType="clickEffect">
+                                  <p:stCondLst>
+                                    <p:cond delay="0"/>
+                                  </p:stCondLst>
+                                  <p:childTnLst>
+                                    <p:set>
+                                      <p:cBhvr>
+                                        <p:cTn id="6" dur="1" fill="hold">
+                                          <p:stCondLst>
+                                            <p:cond delay="0"/>
+                                          </p:stCondLst>
+                                        </p:cTn>
+                                        <p:tgtEl>
+                                          <p:spTgt spid="143"/>
+                                        </p:tgtEl>
+                                        <p:attrNameLst>
+                                          <p:attrName>style.visibility</p:attrName>
+                                        </p:attrNameLst>
+                                      </p:cBhvr>
+                                      <p:to>
+                                        <p:strVal val="visible"/>
+                                      </p:to>
+                                    </p:set>
+                                  </p:childTnLst>
+                                </p:cTn>
+                              </p:par>
+                            </p:childTnLst>
+                          </p:cTn>
+                        </p:par>
+                      </p:childTnLst>
+                    </p:cTn>
+                  </p:par>
+                </p:childTnLst>
+              </p:cTn>
+              <p:prevCondLst>
+                <p:cond evt="onPrev" delay="0">
+                  <p:tgtEl>
+                    <p:sldTgt/>
+                  </p:tgtEl>
+                </p:cond>
+              </p:prevCondLst>
+              <p:nextCondLst>
+                <p:cond evt="onNext" delay="0">
+                  <p:tgtEl>
+                    <p:sldTgt/>
+                  </p:tgtEl>
+                </p:cond>
+              </p:nextCondLst>
+            </p:seq>
+          </p:childTnLst>
+        </p:cTn>
+      </p:par>
+    </p:tnLst>
+  </p:timing>
 </p:sld>
 </file>
 

</xml_diff>